<commit_message>
#27 pull all code
</commit_message>
<xml_diff>
--- a/docs/ER-DIAGRAM.pptx
+++ b/docs/ER-DIAGRAM.pptx
@@ -7,6 +7,7 @@
   <p:sldIdLst>
     <p:sldId id="256" r:id="rId2"/>
     <p:sldId id="258" r:id="rId3"/>
+    <p:sldId id="259" r:id="rId4"/>
   </p:sldIdLst>
   <p:sldSz cx="12192000" cy="6858000"/>
   <p:notesSz cx="6858000" cy="9144000"/>
@@ -242,7 +243,7 @@
           <a:p>
             <a:fld id="{28BE630F-C39C-4DB9-8258-0B48CA067079}" type="datetimeFigureOut">
               <a:rPr lang="en-US" smtClean="0"/>
-              <a:t>11/27/2021</a:t>
+              <a:t>12/11/2021</a:t>
             </a:fld>
             <a:endParaRPr lang="en-US"/>
           </a:p>
@@ -410,7 +411,7 @@
           <a:p>
             <a:fld id="{28BE630F-C39C-4DB9-8258-0B48CA067079}" type="datetimeFigureOut">
               <a:rPr lang="en-US" smtClean="0"/>
-              <a:t>11/27/2021</a:t>
+              <a:t>12/11/2021</a:t>
             </a:fld>
             <a:endParaRPr lang="en-US"/>
           </a:p>
@@ -588,7 +589,7 @@
           <a:p>
             <a:fld id="{28BE630F-C39C-4DB9-8258-0B48CA067079}" type="datetimeFigureOut">
               <a:rPr lang="en-US" smtClean="0"/>
-              <a:t>11/27/2021</a:t>
+              <a:t>12/11/2021</a:t>
             </a:fld>
             <a:endParaRPr lang="en-US"/>
           </a:p>
@@ -756,7 +757,7 @@
           <a:p>
             <a:fld id="{28BE630F-C39C-4DB9-8258-0B48CA067079}" type="datetimeFigureOut">
               <a:rPr lang="en-US" smtClean="0"/>
-              <a:t>11/27/2021</a:t>
+              <a:t>12/11/2021</a:t>
             </a:fld>
             <a:endParaRPr lang="en-US"/>
           </a:p>
@@ -1001,7 +1002,7 @@
           <a:p>
             <a:fld id="{28BE630F-C39C-4DB9-8258-0B48CA067079}" type="datetimeFigureOut">
               <a:rPr lang="en-US" smtClean="0"/>
-              <a:t>11/27/2021</a:t>
+              <a:t>12/11/2021</a:t>
             </a:fld>
             <a:endParaRPr lang="en-US"/>
           </a:p>
@@ -1230,7 +1231,7 @@
           <a:p>
             <a:fld id="{28BE630F-C39C-4DB9-8258-0B48CA067079}" type="datetimeFigureOut">
               <a:rPr lang="en-US" smtClean="0"/>
-              <a:t>11/27/2021</a:t>
+              <a:t>12/11/2021</a:t>
             </a:fld>
             <a:endParaRPr lang="en-US"/>
           </a:p>
@@ -1594,7 +1595,7 @@
           <a:p>
             <a:fld id="{28BE630F-C39C-4DB9-8258-0B48CA067079}" type="datetimeFigureOut">
               <a:rPr lang="en-US" smtClean="0"/>
-              <a:t>11/27/2021</a:t>
+              <a:t>12/11/2021</a:t>
             </a:fld>
             <a:endParaRPr lang="en-US"/>
           </a:p>
@@ -1711,7 +1712,7 @@
           <a:p>
             <a:fld id="{28BE630F-C39C-4DB9-8258-0B48CA067079}" type="datetimeFigureOut">
               <a:rPr lang="en-US" smtClean="0"/>
-              <a:t>11/27/2021</a:t>
+              <a:t>12/11/2021</a:t>
             </a:fld>
             <a:endParaRPr lang="en-US"/>
           </a:p>
@@ -1806,7 +1807,7 @@
           <a:p>
             <a:fld id="{28BE630F-C39C-4DB9-8258-0B48CA067079}" type="datetimeFigureOut">
               <a:rPr lang="en-US" smtClean="0"/>
-              <a:t>11/27/2021</a:t>
+              <a:t>12/11/2021</a:t>
             </a:fld>
             <a:endParaRPr lang="en-US"/>
           </a:p>
@@ -2081,7 +2082,7 @@
           <a:p>
             <a:fld id="{28BE630F-C39C-4DB9-8258-0B48CA067079}" type="datetimeFigureOut">
               <a:rPr lang="en-US" smtClean="0"/>
-              <a:t>11/27/2021</a:t>
+              <a:t>12/11/2021</a:t>
             </a:fld>
             <a:endParaRPr lang="en-US"/>
           </a:p>
@@ -2333,7 +2334,7 @@
           <a:p>
             <a:fld id="{28BE630F-C39C-4DB9-8258-0B48CA067079}" type="datetimeFigureOut">
               <a:rPr lang="en-US" smtClean="0"/>
-              <a:t>11/27/2021</a:t>
+              <a:t>12/11/2021</a:t>
             </a:fld>
             <a:endParaRPr lang="en-US"/>
           </a:p>
@@ -2544,7 +2545,7 @@
           <a:p>
             <a:fld id="{28BE630F-C39C-4DB9-8258-0B48CA067079}" type="datetimeFigureOut">
               <a:rPr lang="en-US" smtClean="0"/>
-              <a:t>11/27/2021</a:t>
+              <a:t>12/11/2021</a:t>
             </a:fld>
             <a:endParaRPr lang="en-US"/>
           </a:p>
@@ -4220,6 +4221,355 @@
 </p:sld>
 </file>
 
+<file path=ppt/slides/slide3.xml><?xml version="1.0" encoding="utf-8"?>
+<p:sld xmlns:a="http://schemas.openxmlformats.org/drawingml/2006/main" xmlns:r="http://schemas.openxmlformats.org/officeDocument/2006/relationships" xmlns:p="http://schemas.openxmlformats.org/presentationml/2006/main">
+  <p:cSld>
+    <p:spTree>
+      <p:nvGrpSpPr>
+        <p:cNvPr id="1" name=""/>
+        <p:cNvGrpSpPr/>
+        <p:nvPr/>
+      </p:nvGrpSpPr>
+      <p:grpSpPr>
+        <a:xfrm>
+          <a:off x="0" y="0"/>
+          <a:ext cx="0" cy="0"/>
+          <a:chOff x="0" y="0"/>
+          <a:chExt cx="0" cy="0"/>
+        </a:xfrm>
+      </p:grpSpPr>
+      <p:graphicFrame>
+        <p:nvGraphicFramePr>
+          <p:cNvPr id="4" name="Table 4">
+            <a:extLst>
+              <a:ext uri="{FF2B5EF4-FFF2-40B4-BE49-F238E27FC236}">
+                <a16:creationId xmlns:a16="http://schemas.microsoft.com/office/drawing/2014/main" id="{968E2EB1-847F-4852-AC7A-AB71716BA3CC}"/>
+              </a:ext>
+            </a:extLst>
+          </p:cNvPr>
+          <p:cNvGraphicFramePr>
+            <a:graphicFrameLocks noGrp="1"/>
+          </p:cNvGraphicFramePr>
+          <p:nvPr>
+            <p:extLst>
+              <p:ext uri="{D42A27DB-BD31-4B8C-83A1-F6EECF244321}">
+                <p14:modId xmlns:p14="http://schemas.microsoft.com/office/powerpoint/2010/main" val="3440503474"/>
+              </p:ext>
+            </p:extLst>
+          </p:nvPr>
+        </p:nvGraphicFramePr>
+        <p:xfrm>
+          <a:off x="2397760" y="4802292"/>
+          <a:ext cx="2550160" cy="1068494"/>
+        </p:xfrm>
+        <a:graphic>
+          <a:graphicData uri="http://schemas.openxmlformats.org/drawingml/2006/table">
+            <a:tbl>
+              <a:tblPr firstRow="1" bandRow="1">
+                <a:tableStyleId>{5C22544A-7EE6-4342-B048-85BDC9FD1C3A}</a:tableStyleId>
+              </a:tblPr>
+              <a:tblGrid>
+                <a:gridCol w="2550160">
+                  <a:extLst>
+                    <a:ext uri="{9D8B030D-6E8A-4147-A177-3AD203B41FA5}">
+                      <a16:colId xmlns:a16="http://schemas.microsoft.com/office/drawing/2014/main" val="3655095449"/>
+                    </a:ext>
+                  </a:extLst>
+                </a:gridCol>
+              </a:tblGrid>
+              <a:tr h="534247">
+                <a:tc>
+                  <a:txBody>
+                    <a:bodyPr/>
+                    <a:lstStyle/>
+                    <a:p>
+                      <a:pPr algn="ctr"/>
+                      <a:r>
+                        <a:rPr lang="en-US" dirty="0"/>
+                        <a:t>Users</a:t>
+                      </a:r>
+                    </a:p>
+                  </a:txBody>
+                  <a:tcPr/>
+                </a:tc>
+                <a:extLst>
+                  <a:ext uri="{0D108BD9-81ED-4DB2-BD59-A6C34878D82A}">
+                    <a16:rowId xmlns:a16="http://schemas.microsoft.com/office/drawing/2014/main" val="4209426325"/>
+                  </a:ext>
+                </a:extLst>
+              </a:tr>
+              <a:tr h="534247">
+                <a:tc>
+                  <a:txBody>
+                    <a:bodyPr/>
+                    <a:lstStyle/>
+                    <a:p>
+                      <a:endParaRPr lang="en-US" dirty="0"/>
+                    </a:p>
+                  </a:txBody>
+                  <a:tcPr/>
+                </a:tc>
+                <a:extLst>
+                  <a:ext uri="{0D108BD9-81ED-4DB2-BD59-A6C34878D82A}">
+                    <a16:rowId xmlns:a16="http://schemas.microsoft.com/office/drawing/2014/main" val="3289758750"/>
+                  </a:ext>
+                </a:extLst>
+              </a:tr>
+            </a:tbl>
+          </a:graphicData>
+        </a:graphic>
+      </p:graphicFrame>
+      <p:graphicFrame>
+        <p:nvGraphicFramePr>
+          <p:cNvPr id="5" name="Table 4">
+            <a:extLst>
+              <a:ext uri="{FF2B5EF4-FFF2-40B4-BE49-F238E27FC236}">
+                <a16:creationId xmlns:a16="http://schemas.microsoft.com/office/drawing/2014/main" id="{AE84A699-815A-48B1-87A7-9E8D9875C6FF}"/>
+              </a:ext>
+            </a:extLst>
+          </p:cNvPr>
+          <p:cNvGraphicFramePr>
+            <a:graphicFrameLocks noGrp="1"/>
+          </p:cNvGraphicFramePr>
+          <p:nvPr>
+            <p:extLst>
+              <p:ext uri="{D42A27DB-BD31-4B8C-83A1-F6EECF244321}">
+                <p14:modId xmlns:p14="http://schemas.microsoft.com/office/powerpoint/2010/main" val="274945668"/>
+              </p:ext>
+            </p:extLst>
+          </p:nvPr>
+        </p:nvGraphicFramePr>
+        <p:xfrm>
+          <a:off x="7244080" y="4824306"/>
+          <a:ext cx="2550160" cy="1068494"/>
+        </p:xfrm>
+        <a:graphic>
+          <a:graphicData uri="http://schemas.openxmlformats.org/drawingml/2006/table">
+            <a:tbl>
+              <a:tblPr firstRow="1" bandRow="1">
+                <a:tableStyleId>{5C22544A-7EE6-4342-B048-85BDC9FD1C3A}</a:tableStyleId>
+              </a:tblPr>
+              <a:tblGrid>
+                <a:gridCol w="2550160">
+                  <a:extLst>
+                    <a:ext uri="{9D8B030D-6E8A-4147-A177-3AD203B41FA5}">
+                      <a16:colId xmlns:a16="http://schemas.microsoft.com/office/drawing/2014/main" val="3655095449"/>
+                    </a:ext>
+                  </a:extLst>
+                </a:gridCol>
+              </a:tblGrid>
+              <a:tr h="534247">
+                <a:tc>
+                  <a:txBody>
+                    <a:bodyPr/>
+                    <a:lstStyle/>
+                    <a:p>
+                      <a:pPr algn="ctr"/>
+                      <a:r>
+                        <a:rPr lang="en-US" dirty="0"/>
+                        <a:t>Events</a:t>
+                      </a:r>
+                    </a:p>
+                  </a:txBody>
+                  <a:tcPr/>
+                </a:tc>
+                <a:extLst>
+                  <a:ext uri="{0D108BD9-81ED-4DB2-BD59-A6C34878D82A}">
+                    <a16:rowId xmlns:a16="http://schemas.microsoft.com/office/drawing/2014/main" val="4209426325"/>
+                  </a:ext>
+                </a:extLst>
+              </a:tr>
+              <a:tr h="534247">
+                <a:tc>
+                  <a:txBody>
+                    <a:bodyPr/>
+                    <a:lstStyle/>
+                    <a:p>
+                      <a:endParaRPr lang="en-US" dirty="0"/>
+                    </a:p>
+                  </a:txBody>
+                  <a:tcPr/>
+                </a:tc>
+                <a:extLst>
+                  <a:ext uri="{0D108BD9-81ED-4DB2-BD59-A6C34878D82A}">
+                    <a16:rowId xmlns:a16="http://schemas.microsoft.com/office/drawing/2014/main" val="3289758750"/>
+                  </a:ext>
+                </a:extLst>
+              </a:tr>
+            </a:tbl>
+          </a:graphicData>
+        </a:graphic>
+      </p:graphicFrame>
+      <p:graphicFrame>
+        <p:nvGraphicFramePr>
+          <p:cNvPr id="6" name="Table 4">
+            <a:extLst>
+              <a:ext uri="{FF2B5EF4-FFF2-40B4-BE49-F238E27FC236}">
+                <a16:creationId xmlns:a16="http://schemas.microsoft.com/office/drawing/2014/main" id="{B4B81817-45C7-489E-88EF-262C6F2D255F}"/>
+              </a:ext>
+            </a:extLst>
+          </p:cNvPr>
+          <p:cNvGraphicFramePr>
+            <a:graphicFrameLocks noGrp="1"/>
+          </p:cNvGraphicFramePr>
+          <p:nvPr>
+            <p:extLst>
+              <p:ext uri="{D42A27DB-BD31-4B8C-83A1-F6EECF244321}">
+                <p14:modId xmlns:p14="http://schemas.microsoft.com/office/powerpoint/2010/main" val="3464067881"/>
+              </p:ext>
+            </p:extLst>
+          </p:nvPr>
+        </p:nvGraphicFramePr>
+        <p:xfrm>
+          <a:off x="4820920" y="1835572"/>
+          <a:ext cx="2550160" cy="1068494"/>
+        </p:xfrm>
+        <a:graphic>
+          <a:graphicData uri="http://schemas.openxmlformats.org/drawingml/2006/table">
+            <a:tbl>
+              <a:tblPr firstRow="1" bandRow="1">
+                <a:tableStyleId>{5C22544A-7EE6-4342-B048-85BDC9FD1C3A}</a:tableStyleId>
+              </a:tblPr>
+              <a:tblGrid>
+                <a:gridCol w="2550160">
+                  <a:extLst>
+                    <a:ext uri="{9D8B030D-6E8A-4147-A177-3AD203B41FA5}">
+                      <a16:colId xmlns:a16="http://schemas.microsoft.com/office/drawing/2014/main" val="3655095449"/>
+                    </a:ext>
+                  </a:extLst>
+                </a:gridCol>
+              </a:tblGrid>
+              <a:tr h="534247">
+                <a:tc>
+                  <a:txBody>
+                    <a:bodyPr/>
+                    <a:lstStyle/>
+                    <a:p>
+                      <a:pPr algn="ctr"/>
+                      <a:r>
+                        <a:rPr lang="en-US" dirty="0"/>
+                        <a:t>Join</a:t>
+                      </a:r>
+                    </a:p>
+                  </a:txBody>
+                  <a:tcPr/>
+                </a:tc>
+                <a:extLst>
+                  <a:ext uri="{0D108BD9-81ED-4DB2-BD59-A6C34878D82A}">
+                    <a16:rowId xmlns:a16="http://schemas.microsoft.com/office/drawing/2014/main" val="4209426325"/>
+                  </a:ext>
+                </a:extLst>
+              </a:tr>
+              <a:tr h="534247">
+                <a:tc>
+                  <a:txBody>
+                    <a:bodyPr/>
+                    <a:lstStyle/>
+                    <a:p>
+                      <a:r>
+                        <a:rPr lang="en-US"/>
+                        <a:t>Id</a:t>
+                      </a:r>
+                      <a:endParaRPr lang="en-US" dirty="0"/>
+                    </a:p>
+                  </a:txBody>
+                  <a:tcPr/>
+                </a:tc>
+                <a:extLst>
+                  <a:ext uri="{0D108BD9-81ED-4DB2-BD59-A6C34878D82A}">
+                    <a16:rowId xmlns:a16="http://schemas.microsoft.com/office/drawing/2014/main" val="3289758750"/>
+                  </a:ext>
+                </a:extLst>
+              </a:tr>
+            </a:tbl>
+          </a:graphicData>
+        </a:graphic>
+      </p:graphicFrame>
+      <p:cxnSp>
+        <p:nvCxnSpPr>
+          <p:cNvPr id="8" name="Straight Connector 7">
+            <a:extLst>
+              <a:ext uri="{FF2B5EF4-FFF2-40B4-BE49-F238E27FC236}">
+                <a16:creationId xmlns:a16="http://schemas.microsoft.com/office/drawing/2014/main" id="{D27EC240-5E48-428E-B34E-3ED01D290666}"/>
+              </a:ext>
+            </a:extLst>
+          </p:cNvPr>
+          <p:cNvCxnSpPr/>
+          <p:nvPr/>
+        </p:nvCxnSpPr>
+        <p:spPr>
+          <a:xfrm flipV="1">
+            <a:off x="3672840" y="2814320"/>
+            <a:ext cx="1148080" cy="1987972"/>
+          </a:xfrm>
+          <a:prstGeom prst="line">
+            <a:avLst/>
+          </a:prstGeom>
+        </p:spPr>
+        <p:style>
+          <a:lnRef idx="1">
+            <a:schemeClr val="dk1"/>
+          </a:lnRef>
+          <a:fillRef idx="0">
+            <a:schemeClr val="dk1"/>
+          </a:fillRef>
+          <a:effectRef idx="0">
+            <a:schemeClr val="dk1"/>
+          </a:effectRef>
+          <a:fontRef idx="minor">
+            <a:schemeClr val="tx1"/>
+          </a:fontRef>
+        </p:style>
+      </p:cxnSp>
+      <p:cxnSp>
+        <p:nvCxnSpPr>
+          <p:cNvPr id="10" name="Straight Connector 9">
+            <a:extLst>
+              <a:ext uri="{FF2B5EF4-FFF2-40B4-BE49-F238E27FC236}">
+                <a16:creationId xmlns:a16="http://schemas.microsoft.com/office/drawing/2014/main" id="{1E51D58F-0044-46AF-9409-7A4B5CC98F5C}"/>
+              </a:ext>
+            </a:extLst>
+          </p:cNvPr>
+          <p:cNvCxnSpPr/>
+          <p:nvPr/>
+        </p:nvCxnSpPr>
+        <p:spPr>
+          <a:xfrm flipH="1" flipV="1">
+            <a:off x="7371080" y="2722880"/>
+            <a:ext cx="1407160" cy="2101426"/>
+          </a:xfrm>
+          <a:prstGeom prst="line">
+            <a:avLst/>
+          </a:prstGeom>
+        </p:spPr>
+        <p:style>
+          <a:lnRef idx="1">
+            <a:schemeClr val="dk1"/>
+          </a:lnRef>
+          <a:fillRef idx="0">
+            <a:schemeClr val="dk1"/>
+          </a:fillRef>
+          <a:effectRef idx="0">
+            <a:schemeClr val="dk1"/>
+          </a:effectRef>
+          <a:fontRef idx="minor">
+            <a:schemeClr val="tx1"/>
+          </a:fontRef>
+        </p:style>
+      </p:cxnSp>
+    </p:spTree>
+    <p:extLst>
+      <p:ext uri="{BB962C8B-B14F-4D97-AF65-F5344CB8AC3E}">
+        <p14:creationId xmlns:p14="http://schemas.microsoft.com/office/powerpoint/2010/main" val="904374054"/>
+      </p:ext>
+    </p:extLst>
+  </p:cSld>
+  <p:clrMapOvr>
+    <a:masterClrMapping/>
+  </p:clrMapOvr>
+</p:sld>
+</file>
+
 <file path=ppt/theme/theme1.xml><?xml version="1.0" encoding="utf-8"?>
 <a:theme xmlns:a="http://schemas.openxmlformats.org/drawingml/2006/main" name="Office Theme">
   <a:themeElements>

</xml_diff>